<commit_message>
Deploying to gh-pages from @ YoungJIn94/YoungJIn94.github.io@2a4d64741d9f4ff2a4a4ff063ad9f0e1725d394c 🚀
</commit_message>
<xml_diff>
--- a/assets/img/publication_preview/ColorRouter.pptx
+++ b/assets/img/publication_preview/ColorRouter.pptx
@@ -10,7 +10,7 @@
   <p:sldIdLst>
     <p:sldId id="256" r:id="rId2"/>
   </p:sldIdLst>
-  <p:sldSz cx="6840538" cy="3600450"/>
+  <p:sldSz cx="4140200" cy="4140200"/>
   <p:notesSz cx="7772400" cy="10058400"/>
   <p:defaultTextStyle>
     <a:defPPr>
@@ -215,8 +215,8 @@
         </p:nvSpPr>
         <p:spPr>
           <a:xfrm>
-            <a:off x="661988" y="1257300"/>
-            <a:ext cx="6448425" cy="3394075"/>
+            <a:off x="2189163" y="1257300"/>
+            <a:ext cx="3394075" cy="3394075"/>
           </a:xfrm>
           <a:prstGeom prst="rect">
             <a:avLst/>
@@ -491,7 +491,12 @@
             <p:ph type="sldImg"/>
           </p:nvPr>
         </p:nvSpPr>
-        <p:spPr/>
+        <p:spPr>
+          <a:xfrm>
+            <a:off x="2189163" y="1257300"/>
+            <a:ext cx="3394075" cy="3394075"/>
+          </a:xfrm>
+        </p:spPr>
       </p:sp>
       <p:sp>
         <p:nvSpPr>
@@ -602,8 +607,8 @@
         </p:nvSpPr>
         <p:spPr>
           <a:xfrm>
-            <a:off x="342027" y="143640"/>
-            <a:ext cx="6156215" cy="601020"/>
+            <a:off x="207011" y="165173"/>
+            <a:ext cx="3726017" cy="691120"/>
           </a:xfrm>
           <a:prstGeom prst="rect">
             <a:avLst/>
@@ -614,7 +619,7 @@
           <a:lstStyle/>
           <a:p>
             <a:pPr algn="ctr"/>
-            <a:endParaRPr lang="en-US" sz="4400" b="0" strike="noStrike" spc="-1">
+            <a:endParaRPr lang="en-US" sz="5060" b="0" strike="noStrike" spc="-1">
               <a:latin typeface="Arial"/>
             </a:endParaRPr>
           </a:p>
@@ -632,8 +637,8 @@
         </p:nvSpPr>
         <p:spPr>
           <a:xfrm>
-            <a:off x="342027" y="842374"/>
-            <a:ext cx="6156215" cy="995841"/>
+            <a:off x="207011" y="968658"/>
+            <a:ext cx="3726017" cy="1145129"/>
           </a:xfrm>
           <a:prstGeom prst="rect">
             <a:avLst/>
@@ -645,7 +650,7 @@
           </a:bodyPr>
           <a:lstStyle/>
           <a:p>
-            <a:endParaRPr lang="en-US" sz="3200" b="0" strike="noStrike" spc="-1">
+            <a:endParaRPr lang="en-US" sz="3680" b="0" strike="noStrike" spc="-1">
               <a:latin typeface="Arial"/>
             </a:endParaRPr>
           </a:p>
@@ -663,8 +668,8 @@
         </p:nvSpPr>
         <p:spPr>
           <a:xfrm>
-            <a:off x="342027" y="1933093"/>
-            <a:ext cx="6156215" cy="995841"/>
+            <a:off x="207011" y="2222888"/>
+            <a:ext cx="3726017" cy="1145129"/>
           </a:xfrm>
           <a:prstGeom prst="rect">
             <a:avLst/>
@@ -676,7 +681,7 @@
           </a:bodyPr>
           <a:lstStyle/>
           <a:p>
-            <a:endParaRPr lang="en-US" sz="3200" b="0" strike="noStrike" spc="-1">
+            <a:endParaRPr lang="en-US" sz="3680" b="0" strike="noStrike" spc="-1">
               <a:latin typeface="Arial"/>
             </a:endParaRPr>
           </a:p>
@@ -719,8 +724,8 @@
         </p:nvSpPr>
         <p:spPr>
           <a:xfrm>
-            <a:off x="342027" y="143640"/>
-            <a:ext cx="6156215" cy="601020"/>
+            <a:off x="207011" y="165173"/>
+            <a:ext cx="3726017" cy="691120"/>
           </a:xfrm>
           <a:prstGeom prst="rect">
             <a:avLst/>
@@ -731,7 +736,7 @@
           <a:lstStyle/>
           <a:p>
             <a:pPr algn="ctr"/>
-            <a:endParaRPr lang="en-US" sz="4400" b="0" strike="noStrike" spc="-1">
+            <a:endParaRPr lang="en-US" sz="5060" b="0" strike="noStrike" spc="-1">
               <a:latin typeface="Arial"/>
             </a:endParaRPr>
           </a:p>
@@ -749,8 +754,8 @@
         </p:nvSpPr>
         <p:spPr>
           <a:xfrm>
-            <a:off x="342026" y="842374"/>
-            <a:ext cx="3004182" cy="995841"/>
+            <a:off x="207009" y="968658"/>
+            <a:ext cx="1818266" cy="1145129"/>
           </a:xfrm>
           <a:prstGeom prst="rect">
             <a:avLst/>
@@ -762,7 +767,7 @@
           </a:bodyPr>
           <a:lstStyle/>
           <a:p>
-            <a:endParaRPr lang="en-US" sz="3200" b="0" strike="noStrike" spc="-1">
+            <a:endParaRPr lang="en-US" sz="3680" b="0" strike="noStrike" spc="-1">
               <a:latin typeface="Arial"/>
             </a:endParaRPr>
           </a:p>
@@ -780,8 +785,8 @@
         </p:nvSpPr>
         <p:spPr>
           <a:xfrm>
-            <a:off x="3496754" y="842374"/>
-            <a:ext cx="3004182" cy="995841"/>
+            <a:off x="2116392" y="968658"/>
+            <a:ext cx="1818266" cy="1145129"/>
           </a:xfrm>
           <a:prstGeom prst="rect">
             <a:avLst/>
@@ -793,7 +798,7 @@
           </a:bodyPr>
           <a:lstStyle/>
           <a:p>
-            <a:endParaRPr lang="en-US" sz="3200" b="0" strike="noStrike" spc="-1">
+            <a:endParaRPr lang="en-US" sz="3680" b="0" strike="noStrike" spc="-1">
               <a:latin typeface="Arial"/>
             </a:endParaRPr>
           </a:p>
@@ -811,8 +816,8 @@
         </p:nvSpPr>
         <p:spPr>
           <a:xfrm>
-            <a:off x="342026" y="1933093"/>
-            <a:ext cx="3004182" cy="995841"/>
+            <a:off x="207009" y="2222888"/>
+            <a:ext cx="1818266" cy="1145129"/>
           </a:xfrm>
           <a:prstGeom prst="rect">
             <a:avLst/>
@@ -824,7 +829,7 @@
           </a:bodyPr>
           <a:lstStyle/>
           <a:p>
-            <a:endParaRPr lang="en-US" sz="3200" b="0" strike="noStrike" spc="-1">
+            <a:endParaRPr lang="en-US" sz="3680" b="0" strike="noStrike" spc="-1">
               <a:latin typeface="Arial"/>
             </a:endParaRPr>
           </a:p>
@@ -842,8 +847,8 @@
         </p:nvSpPr>
         <p:spPr>
           <a:xfrm>
-            <a:off x="3496754" y="1933093"/>
-            <a:ext cx="3004182" cy="995841"/>
+            <a:off x="2116392" y="2222888"/>
+            <a:ext cx="1818266" cy="1145129"/>
           </a:xfrm>
           <a:prstGeom prst="rect">
             <a:avLst/>
@@ -855,7 +860,7 @@
           </a:bodyPr>
           <a:lstStyle/>
           <a:p>
-            <a:endParaRPr lang="en-US" sz="3200" b="0" strike="noStrike" spc="-1">
+            <a:endParaRPr lang="en-US" sz="3680" b="0" strike="noStrike" spc="-1">
               <a:latin typeface="Arial"/>
             </a:endParaRPr>
           </a:p>
@@ -898,8 +903,8 @@
         </p:nvSpPr>
         <p:spPr>
           <a:xfrm>
-            <a:off x="342027" y="143640"/>
-            <a:ext cx="6156215" cy="601020"/>
+            <a:off x="207011" y="165173"/>
+            <a:ext cx="3726017" cy="691120"/>
           </a:xfrm>
           <a:prstGeom prst="rect">
             <a:avLst/>
@@ -910,7 +915,7 @@
           <a:lstStyle/>
           <a:p>
             <a:pPr algn="ctr"/>
-            <a:endParaRPr lang="en-US" sz="4400" b="0" strike="noStrike" spc="-1">
+            <a:endParaRPr lang="en-US" sz="5060" b="0" strike="noStrike" spc="-1">
               <a:latin typeface="Arial"/>
             </a:endParaRPr>
           </a:p>
@@ -928,8 +933,8 @@
         </p:nvSpPr>
         <p:spPr>
           <a:xfrm>
-            <a:off x="342027" y="842374"/>
-            <a:ext cx="1982140" cy="995841"/>
+            <a:off x="207010" y="968658"/>
+            <a:ext cx="1199680" cy="1145129"/>
           </a:xfrm>
           <a:prstGeom prst="rect">
             <a:avLst/>
@@ -941,7 +946,7 @@
           </a:bodyPr>
           <a:lstStyle/>
           <a:p>
-            <a:endParaRPr lang="en-US" sz="3200" b="0" strike="noStrike" spc="-1">
+            <a:endParaRPr lang="en-US" sz="3680" b="0" strike="noStrike" spc="-1">
               <a:latin typeface="Arial"/>
             </a:endParaRPr>
           </a:p>
@@ -959,8 +964,8 @@
         </p:nvSpPr>
         <p:spPr>
           <a:xfrm>
-            <a:off x="2423543" y="842374"/>
-            <a:ext cx="1982140" cy="995841"/>
+            <a:off x="1466837" y="968658"/>
+            <a:ext cx="1199680" cy="1145129"/>
           </a:xfrm>
           <a:prstGeom prst="rect">
             <a:avLst/>
@@ -972,7 +977,7 @@
           </a:bodyPr>
           <a:lstStyle/>
           <a:p>
-            <a:endParaRPr lang="en-US" sz="3200" b="0" strike="noStrike" spc="-1">
+            <a:endParaRPr lang="en-US" sz="3680" b="0" strike="noStrike" spc="-1">
               <a:latin typeface="Arial"/>
             </a:endParaRPr>
           </a:p>
@@ -990,8 +995,8 @@
         </p:nvSpPr>
         <p:spPr>
           <a:xfrm>
-            <a:off x="4505060" y="842374"/>
-            <a:ext cx="1982140" cy="995841"/>
+            <a:off x="2726664" y="968658"/>
+            <a:ext cx="1199680" cy="1145129"/>
           </a:xfrm>
           <a:prstGeom prst="rect">
             <a:avLst/>
@@ -1003,7 +1008,7 @@
           </a:bodyPr>
           <a:lstStyle/>
           <a:p>
-            <a:endParaRPr lang="en-US" sz="3200" b="0" strike="noStrike" spc="-1">
+            <a:endParaRPr lang="en-US" sz="3680" b="0" strike="noStrike" spc="-1">
               <a:latin typeface="Arial"/>
             </a:endParaRPr>
           </a:p>
@@ -1021,8 +1026,8 @@
         </p:nvSpPr>
         <p:spPr>
           <a:xfrm>
-            <a:off x="342027" y="1933093"/>
-            <a:ext cx="1982140" cy="995841"/>
+            <a:off x="207010" y="2222888"/>
+            <a:ext cx="1199680" cy="1145129"/>
           </a:xfrm>
           <a:prstGeom prst="rect">
             <a:avLst/>
@@ -1034,7 +1039,7 @@
           </a:bodyPr>
           <a:lstStyle/>
           <a:p>
-            <a:endParaRPr lang="en-US" sz="3200" b="0" strike="noStrike" spc="-1">
+            <a:endParaRPr lang="en-US" sz="3680" b="0" strike="noStrike" spc="-1">
               <a:latin typeface="Arial"/>
             </a:endParaRPr>
           </a:p>
@@ -1052,8 +1057,8 @@
         </p:nvSpPr>
         <p:spPr>
           <a:xfrm>
-            <a:off x="2423543" y="1933093"/>
-            <a:ext cx="1982140" cy="995841"/>
+            <a:off x="1466837" y="2222888"/>
+            <a:ext cx="1199680" cy="1145129"/>
           </a:xfrm>
           <a:prstGeom prst="rect">
             <a:avLst/>
@@ -1065,7 +1070,7 @@
           </a:bodyPr>
           <a:lstStyle/>
           <a:p>
-            <a:endParaRPr lang="en-US" sz="3200" b="0" strike="noStrike" spc="-1">
+            <a:endParaRPr lang="en-US" sz="3680" b="0" strike="noStrike" spc="-1">
               <a:latin typeface="Arial"/>
             </a:endParaRPr>
           </a:p>
@@ -1083,8 +1088,8 @@
         </p:nvSpPr>
         <p:spPr>
           <a:xfrm>
-            <a:off x="4505060" y="1933093"/>
-            <a:ext cx="1982140" cy="995841"/>
+            <a:off x="2726664" y="2222888"/>
+            <a:ext cx="1199680" cy="1145129"/>
           </a:xfrm>
           <a:prstGeom prst="rect">
             <a:avLst/>
@@ -1096,7 +1101,7 @@
           </a:bodyPr>
           <a:lstStyle/>
           <a:p>
-            <a:endParaRPr lang="en-US" sz="3200" b="0" strike="noStrike" spc="-1">
+            <a:endParaRPr lang="en-US" sz="3680" b="0" strike="noStrike" spc="-1">
               <a:latin typeface="Arial"/>
             </a:endParaRPr>
           </a:p>
@@ -1139,8 +1144,8 @@
         </p:nvSpPr>
         <p:spPr>
           <a:xfrm>
-            <a:off x="342027" y="143640"/>
-            <a:ext cx="6156215" cy="601020"/>
+            <a:off x="207011" y="165173"/>
+            <a:ext cx="3726017" cy="691120"/>
           </a:xfrm>
           <a:prstGeom prst="rect">
             <a:avLst/>
@@ -1151,7 +1156,7 @@
           <a:lstStyle/>
           <a:p>
             <a:pPr algn="ctr"/>
-            <a:endParaRPr lang="en-US" sz="4400" b="0" strike="noStrike" spc="-1">
+            <a:endParaRPr lang="en-US" sz="5060" b="0" strike="noStrike" spc="-1">
               <a:latin typeface="Arial"/>
             </a:endParaRPr>
           </a:p>
@@ -1169,8 +1174,8 @@
         </p:nvSpPr>
         <p:spPr>
           <a:xfrm>
-            <a:off x="342027" y="842373"/>
-            <a:ext cx="6156215" cy="2088072"/>
+            <a:off x="207011" y="968656"/>
+            <a:ext cx="3726017" cy="2401099"/>
           </a:xfrm>
           <a:prstGeom prst="rect">
             <a:avLst/>
@@ -1181,7 +1186,7 @@
           <a:lstStyle/>
           <a:p>
             <a:pPr algn="ctr"/>
-            <a:endParaRPr lang="en-US" sz="3200" b="0" strike="noStrike" spc="-1">
+            <a:endParaRPr lang="en-US" sz="3680" b="0" strike="noStrike" spc="-1">
               <a:latin typeface="Arial"/>
             </a:endParaRPr>
           </a:p>
@@ -1224,8 +1229,8 @@
         </p:nvSpPr>
         <p:spPr>
           <a:xfrm>
-            <a:off x="342027" y="143640"/>
-            <a:ext cx="6156215" cy="601020"/>
+            <a:off x="207011" y="165173"/>
+            <a:ext cx="3726017" cy="691120"/>
           </a:xfrm>
           <a:prstGeom prst="rect">
             <a:avLst/>
@@ -1236,7 +1241,7 @@
           <a:lstStyle/>
           <a:p>
             <a:pPr algn="ctr"/>
-            <a:endParaRPr lang="en-US" sz="4400" b="0" strike="noStrike" spc="-1">
+            <a:endParaRPr lang="en-US" sz="5060" b="0" strike="noStrike" spc="-1">
               <a:latin typeface="Arial"/>
             </a:endParaRPr>
           </a:p>
@@ -1254,8 +1259,8 @@
         </p:nvSpPr>
         <p:spPr>
           <a:xfrm>
-            <a:off x="342027" y="842373"/>
-            <a:ext cx="6156215" cy="2088072"/>
+            <a:off x="207011" y="968656"/>
+            <a:ext cx="3726017" cy="2401099"/>
           </a:xfrm>
           <a:prstGeom prst="rect">
             <a:avLst/>
@@ -1267,7 +1272,7 @@
           </a:bodyPr>
           <a:lstStyle/>
           <a:p>
-            <a:endParaRPr lang="en-US" sz="3200" b="0" strike="noStrike" spc="-1">
+            <a:endParaRPr lang="en-US" sz="3680" b="0" strike="noStrike" spc="-1">
               <a:latin typeface="Arial"/>
             </a:endParaRPr>
           </a:p>
@@ -1310,8 +1315,8 @@
         </p:nvSpPr>
         <p:spPr>
           <a:xfrm>
-            <a:off x="342027" y="143640"/>
-            <a:ext cx="6156215" cy="601020"/>
+            <a:off x="207011" y="165173"/>
+            <a:ext cx="3726017" cy="691120"/>
           </a:xfrm>
           <a:prstGeom prst="rect">
             <a:avLst/>
@@ -1322,7 +1327,7 @@
           <a:lstStyle/>
           <a:p>
             <a:pPr algn="ctr"/>
-            <a:endParaRPr lang="en-US" sz="4400" b="0" strike="noStrike" spc="-1">
+            <a:endParaRPr lang="en-US" sz="5060" b="0" strike="noStrike" spc="-1">
               <a:latin typeface="Arial"/>
             </a:endParaRPr>
           </a:p>
@@ -1340,8 +1345,8 @@
         </p:nvSpPr>
         <p:spPr>
           <a:xfrm>
-            <a:off x="342026" y="842373"/>
-            <a:ext cx="3004182" cy="2088072"/>
+            <a:off x="207009" y="968656"/>
+            <a:ext cx="1818266" cy="2401099"/>
           </a:xfrm>
           <a:prstGeom prst="rect">
             <a:avLst/>
@@ -1353,7 +1358,7 @@
           </a:bodyPr>
           <a:lstStyle/>
           <a:p>
-            <a:endParaRPr lang="en-US" sz="3200" b="0" strike="noStrike" spc="-1">
+            <a:endParaRPr lang="en-US" sz="3680" b="0" strike="noStrike" spc="-1">
               <a:latin typeface="Arial"/>
             </a:endParaRPr>
           </a:p>
@@ -1371,8 +1376,8 @@
         </p:nvSpPr>
         <p:spPr>
           <a:xfrm>
-            <a:off x="3496754" y="842373"/>
-            <a:ext cx="3004182" cy="2088072"/>
+            <a:off x="2116392" y="968656"/>
+            <a:ext cx="1818266" cy="2401099"/>
           </a:xfrm>
           <a:prstGeom prst="rect">
             <a:avLst/>
@@ -1384,7 +1389,7 @@
           </a:bodyPr>
           <a:lstStyle/>
           <a:p>
-            <a:endParaRPr lang="en-US" sz="3200" b="0" strike="noStrike" spc="-1">
+            <a:endParaRPr lang="en-US" sz="3680" b="0" strike="noStrike" spc="-1">
               <a:latin typeface="Arial"/>
             </a:endParaRPr>
           </a:p>
@@ -1427,8 +1432,8 @@
         </p:nvSpPr>
         <p:spPr>
           <a:xfrm>
-            <a:off x="342027" y="143640"/>
-            <a:ext cx="6156215" cy="601020"/>
+            <a:off x="207011" y="165173"/>
+            <a:ext cx="3726017" cy="691120"/>
           </a:xfrm>
           <a:prstGeom prst="rect">
             <a:avLst/>
@@ -1439,7 +1444,7 @@
           <a:lstStyle/>
           <a:p>
             <a:pPr algn="ctr"/>
-            <a:endParaRPr lang="en-US" sz="4400" b="0" strike="noStrike" spc="-1">
+            <a:endParaRPr lang="en-US" sz="5060" b="0" strike="noStrike" spc="-1">
               <a:latin typeface="Arial"/>
             </a:endParaRPr>
           </a:p>
@@ -1482,8 +1487,8 @@
         </p:nvSpPr>
         <p:spPr>
           <a:xfrm>
-            <a:off x="342027" y="143640"/>
-            <a:ext cx="6156215" cy="2786616"/>
+            <a:off x="207011" y="165174"/>
+            <a:ext cx="3726017" cy="3204363"/>
           </a:xfrm>
           <a:prstGeom prst="rect">
             <a:avLst/>
@@ -1494,7 +1499,7 @@
           <a:lstStyle/>
           <a:p>
             <a:pPr algn="ctr"/>
-            <a:endParaRPr lang="en-US" sz="3200" b="0" strike="noStrike" spc="-1">
+            <a:endParaRPr lang="en-US" sz="3680" b="0" strike="noStrike" spc="-1">
               <a:latin typeface="Arial"/>
             </a:endParaRPr>
           </a:p>
@@ -1537,8 +1542,8 @@
         </p:nvSpPr>
         <p:spPr>
           <a:xfrm>
-            <a:off x="342027" y="143640"/>
-            <a:ext cx="6156215" cy="601020"/>
+            <a:off x="207011" y="165173"/>
+            <a:ext cx="3726017" cy="691120"/>
           </a:xfrm>
           <a:prstGeom prst="rect">
             <a:avLst/>
@@ -1549,7 +1554,7 @@
           <a:lstStyle/>
           <a:p>
             <a:pPr algn="ctr"/>
-            <a:endParaRPr lang="en-US" sz="4400" b="0" strike="noStrike" spc="-1">
+            <a:endParaRPr lang="en-US" sz="5060" b="0" strike="noStrike" spc="-1">
               <a:latin typeface="Arial"/>
             </a:endParaRPr>
           </a:p>
@@ -1567,8 +1572,8 @@
         </p:nvSpPr>
         <p:spPr>
           <a:xfrm>
-            <a:off x="342026" y="842374"/>
-            <a:ext cx="3004182" cy="995841"/>
+            <a:off x="207009" y="968658"/>
+            <a:ext cx="1818266" cy="1145129"/>
           </a:xfrm>
           <a:prstGeom prst="rect">
             <a:avLst/>
@@ -1580,7 +1585,7 @@
           </a:bodyPr>
           <a:lstStyle/>
           <a:p>
-            <a:endParaRPr lang="en-US" sz="3200" b="0" strike="noStrike" spc="-1">
+            <a:endParaRPr lang="en-US" sz="3680" b="0" strike="noStrike" spc="-1">
               <a:latin typeface="Arial"/>
             </a:endParaRPr>
           </a:p>
@@ -1598,8 +1603,8 @@
         </p:nvSpPr>
         <p:spPr>
           <a:xfrm>
-            <a:off x="3496754" y="842373"/>
-            <a:ext cx="3004182" cy="2088072"/>
+            <a:off x="2116392" y="968656"/>
+            <a:ext cx="1818266" cy="2401099"/>
           </a:xfrm>
           <a:prstGeom prst="rect">
             <a:avLst/>
@@ -1611,7 +1616,7 @@
           </a:bodyPr>
           <a:lstStyle/>
           <a:p>
-            <a:endParaRPr lang="en-US" sz="3200" b="0" strike="noStrike" spc="-1">
+            <a:endParaRPr lang="en-US" sz="3680" b="0" strike="noStrike" spc="-1">
               <a:latin typeface="Arial"/>
             </a:endParaRPr>
           </a:p>
@@ -1629,8 +1634,8 @@
         </p:nvSpPr>
         <p:spPr>
           <a:xfrm>
-            <a:off x="342026" y="1933093"/>
-            <a:ext cx="3004182" cy="995841"/>
+            <a:off x="207009" y="2222888"/>
+            <a:ext cx="1818266" cy="1145129"/>
           </a:xfrm>
           <a:prstGeom prst="rect">
             <a:avLst/>
@@ -1642,7 +1647,7 @@
           </a:bodyPr>
           <a:lstStyle/>
           <a:p>
-            <a:endParaRPr lang="en-US" sz="3200" b="0" strike="noStrike" spc="-1">
+            <a:endParaRPr lang="en-US" sz="3680" b="0" strike="noStrike" spc="-1">
               <a:latin typeface="Arial"/>
             </a:endParaRPr>
           </a:p>
@@ -1685,8 +1690,8 @@
         </p:nvSpPr>
         <p:spPr>
           <a:xfrm>
-            <a:off x="342027" y="143640"/>
-            <a:ext cx="6156215" cy="601020"/>
+            <a:off x="207011" y="165173"/>
+            <a:ext cx="3726017" cy="691120"/>
           </a:xfrm>
           <a:prstGeom prst="rect">
             <a:avLst/>
@@ -1697,7 +1702,7 @@
           <a:lstStyle/>
           <a:p>
             <a:pPr algn="ctr"/>
-            <a:endParaRPr lang="en-US" sz="4400" b="0" strike="noStrike" spc="-1">
+            <a:endParaRPr lang="en-US" sz="5060" b="0" strike="noStrike" spc="-1">
               <a:latin typeface="Arial"/>
             </a:endParaRPr>
           </a:p>
@@ -1715,8 +1720,8 @@
         </p:nvSpPr>
         <p:spPr>
           <a:xfrm>
-            <a:off x="342026" y="842373"/>
-            <a:ext cx="3004182" cy="2088072"/>
+            <a:off x="207009" y="968656"/>
+            <a:ext cx="1818266" cy="2401099"/>
           </a:xfrm>
           <a:prstGeom prst="rect">
             <a:avLst/>
@@ -1728,7 +1733,7 @@
           </a:bodyPr>
           <a:lstStyle/>
           <a:p>
-            <a:endParaRPr lang="en-US" sz="3200" b="0" strike="noStrike" spc="-1">
+            <a:endParaRPr lang="en-US" sz="3680" b="0" strike="noStrike" spc="-1">
               <a:latin typeface="Arial"/>
             </a:endParaRPr>
           </a:p>
@@ -1746,8 +1751,8 @@
         </p:nvSpPr>
         <p:spPr>
           <a:xfrm>
-            <a:off x="3496754" y="842374"/>
-            <a:ext cx="3004182" cy="995841"/>
+            <a:off x="2116392" y="968658"/>
+            <a:ext cx="1818266" cy="1145129"/>
           </a:xfrm>
           <a:prstGeom prst="rect">
             <a:avLst/>
@@ -1759,7 +1764,7 @@
           </a:bodyPr>
           <a:lstStyle/>
           <a:p>
-            <a:endParaRPr lang="en-US" sz="3200" b="0" strike="noStrike" spc="-1">
+            <a:endParaRPr lang="en-US" sz="3680" b="0" strike="noStrike" spc="-1">
               <a:latin typeface="Arial"/>
             </a:endParaRPr>
           </a:p>
@@ -1777,8 +1782,8 @@
         </p:nvSpPr>
         <p:spPr>
           <a:xfrm>
-            <a:off x="3496754" y="1933093"/>
-            <a:ext cx="3004182" cy="995841"/>
+            <a:off x="2116392" y="2222888"/>
+            <a:ext cx="1818266" cy="1145129"/>
           </a:xfrm>
           <a:prstGeom prst="rect">
             <a:avLst/>
@@ -1790,7 +1795,7 @@
           </a:bodyPr>
           <a:lstStyle/>
           <a:p>
-            <a:endParaRPr lang="en-US" sz="3200" b="0" strike="noStrike" spc="-1">
+            <a:endParaRPr lang="en-US" sz="3680" b="0" strike="noStrike" spc="-1">
               <a:latin typeface="Arial"/>
             </a:endParaRPr>
           </a:p>
@@ -1833,8 +1838,8 @@
         </p:nvSpPr>
         <p:spPr>
           <a:xfrm>
-            <a:off x="342027" y="143640"/>
-            <a:ext cx="6156215" cy="601020"/>
+            <a:off x="207011" y="165173"/>
+            <a:ext cx="3726017" cy="691120"/>
           </a:xfrm>
           <a:prstGeom prst="rect">
             <a:avLst/>
@@ -1845,7 +1850,7 @@
           <a:lstStyle/>
           <a:p>
             <a:pPr algn="ctr"/>
-            <a:endParaRPr lang="en-US" sz="4400" b="0" strike="noStrike" spc="-1">
+            <a:endParaRPr lang="en-US" sz="5060" b="0" strike="noStrike" spc="-1">
               <a:latin typeface="Arial"/>
             </a:endParaRPr>
           </a:p>
@@ -1863,8 +1868,8 @@
         </p:nvSpPr>
         <p:spPr>
           <a:xfrm>
-            <a:off x="342026" y="842374"/>
-            <a:ext cx="3004182" cy="995841"/>
+            <a:off x="207009" y="968658"/>
+            <a:ext cx="1818266" cy="1145129"/>
           </a:xfrm>
           <a:prstGeom prst="rect">
             <a:avLst/>
@@ -1876,7 +1881,7 @@
           </a:bodyPr>
           <a:lstStyle/>
           <a:p>
-            <a:endParaRPr lang="en-US" sz="3200" b="0" strike="noStrike" spc="-1">
+            <a:endParaRPr lang="en-US" sz="3680" b="0" strike="noStrike" spc="-1">
               <a:latin typeface="Arial"/>
             </a:endParaRPr>
           </a:p>
@@ -1894,8 +1899,8 @@
         </p:nvSpPr>
         <p:spPr>
           <a:xfrm>
-            <a:off x="3496754" y="842374"/>
-            <a:ext cx="3004182" cy="995841"/>
+            <a:off x="2116392" y="968658"/>
+            <a:ext cx="1818266" cy="1145129"/>
           </a:xfrm>
           <a:prstGeom prst="rect">
             <a:avLst/>
@@ -1907,7 +1912,7 @@
           </a:bodyPr>
           <a:lstStyle/>
           <a:p>
-            <a:endParaRPr lang="en-US" sz="3200" b="0" strike="noStrike" spc="-1">
+            <a:endParaRPr lang="en-US" sz="3680" b="0" strike="noStrike" spc="-1">
               <a:latin typeface="Arial"/>
             </a:endParaRPr>
           </a:p>
@@ -1925,8 +1930,8 @@
         </p:nvSpPr>
         <p:spPr>
           <a:xfrm>
-            <a:off x="342027" y="1933093"/>
-            <a:ext cx="6156215" cy="995841"/>
+            <a:off x="207011" y="2222888"/>
+            <a:ext cx="3726017" cy="1145129"/>
           </a:xfrm>
           <a:prstGeom prst="rect">
             <a:avLst/>
@@ -1938,7 +1943,7 @@
           </a:bodyPr>
           <a:lstStyle/>
           <a:p>
-            <a:endParaRPr lang="en-US" sz="3200" b="0" strike="noStrike" spc="-1">
+            <a:endParaRPr lang="en-US" sz="3680" b="0" strike="noStrike" spc="-1">
               <a:latin typeface="Arial"/>
             </a:endParaRPr>
           </a:p>
@@ -1986,7 +1991,7 @@
         <p:spPr>
           <a:xfrm>
             <a:off x="0" y="0"/>
-            <a:ext cx="107725" cy="3600450"/>
+            <a:ext cx="65200" cy="4140200"/>
           </a:xfrm>
           <a:prstGeom prst="rect">
             <a:avLst/>
@@ -2019,8 +2024,8 @@
         </p:nvSpPr>
         <p:spPr>
           <a:xfrm>
-            <a:off x="0" y="1"/>
-            <a:ext cx="107725" cy="629181"/>
+            <a:off x="0" y="3"/>
+            <a:ext cx="65200" cy="723503"/>
           </a:xfrm>
           <a:prstGeom prst="rect">
             <a:avLst/>
@@ -2064,7 +2069,7 @@
   </p:sldLayoutIdLst>
   <p:txStyles>
     <p:titleStyle>
-      <a:lvl1pPr algn="l" defTabSz="914400" rtl="0" eaLnBrk="1" latinLnBrk="1" hangingPunct="1">
+      <a:lvl1pPr algn="l" defTabSz="1051469" rtl="0" eaLnBrk="1" latinLnBrk="1" hangingPunct="1">
         <a:lnSpc>
           <a:spcPct val="90000"/>
         </a:lnSpc>
@@ -2072,7 +2077,7 @@
           <a:spcPct val="0"/>
         </a:spcBef>
         <a:buNone/>
-        <a:defRPr sz="4400" kern="1200">
+        <a:defRPr sz="5060" kern="1200">
           <a:solidFill>
             <a:schemeClr val="tx1"/>
           </a:solidFill>
@@ -2083,16 +2088,16 @@
       </a:lvl1pPr>
     </p:titleStyle>
     <p:bodyStyle>
-      <a:lvl1pPr marL="228600" indent="-228600" algn="l" defTabSz="914400" rtl="0" eaLnBrk="1" latinLnBrk="1" hangingPunct="1">
+      <a:lvl1pPr marL="262867" indent="-262867" algn="l" defTabSz="1051469" rtl="0" eaLnBrk="1" latinLnBrk="1" hangingPunct="1">
         <a:lnSpc>
           <a:spcPct val="90000"/>
         </a:lnSpc>
         <a:spcBef>
-          <a:spcPts val="1000"/>
+          <a:spcPts val="1150"/>
         </a:spcBef>
         <a:buFont typeface="Arial" panose="020B0604020202020204" pitchFamily="34" charset="0"/>
         <a:buChar char="•"/>
-        <a:defRPr sz="2800" kern="1200">
+        <a:defRPr sz="3220" kern="1200">
           <a:solidFill>
             <a:schemeClr val="tx1"/>
           </a:solidFill>
@@ -2101,16 +2106,16 @@
           <a:cs typeface="+mn-cs"/>
         </a:defRPr>
       </a:lvl1pPr>
-      <a:lvl2pPr marL="685800" indent="-228600" algn="l" defTabSz="914400" rtl="0" eaLnBrk="1" latinLnBrk="1" hangingPunct="1">
+      <a:lvl2pPr marL="788601" indent="-262867" algn="l" defTabSz="1051469" rtl="0" eaLnBrk="1" latinLnBrk="1" hangingPunct="1">
         <a:lnSpc>
           <a:spcPct val="90000"/>
         </a:lnSpc>
         <a:spcBef>
-          <a:spcPts val="500"/>
+          <a:spcPts val="575"/>
         </a:spcBef>
         <a:buFont typeface="Arial" panose="020B0604020202020204" pitchFamily="34" charset="0"/>
         <a:buChar char="•"/>
-        <a:defRPr sz="2400" kern="1200">
+        <a:defRPr sz="2760" kern="1200">
           <a:solidFill>
             <a:schemeClr val="tx1"/>
           </a:solidFill>
@@ -2119,16 +2124,16 @@
           <a:cs typeface="+mn-cs"/>
         </a:defRPr>
       </a:lvl2pPr>
-      <a:lvl3pPr marL="1143000" indent="-228600" algn="l" defTabSz="914400" rtl="0" eaLnBrk="1" latinLnBrk="1" hangingPunct="1">
+      <a:lvl3pPr marL="1314336" indent="-262867" algn="l" defTabSz="1051469" rtl="0" eaLnBrk="1" latinLnBrk="1" hangingPunct="1">
         <a:lnSpc>
           <a:spcPct val="90000"/>
         </a:lnSpc>
         <a:spcBef>
-          <a:spcPts val="500"/>
+          <a:spcPts val="575"/>
         </a:spcBef>
         <a:buFont typeface="Arial" panose="020B0604020202020204" pitchFamily="34" charset="0"/>
         <a:buChar char="•"/>
-        <a:defRPr sz="2000" kern="1200">
+        <a:defRPr sz="2300" kern="1200">
           <a:solidFill>
             <a:schemeClr val="tx1"/>
           </a:solidFill>
@@ -2137,16 +2142,16 @@
           <a:cs typeface="+mn-cs"/>
         </a:defRPr>
       </a:lvl3pPr>
-      <a:lvl4pPr marL="1600200" indent="-228600" algn="l" defTabSz="914400" rtl="0" eaLnBrk="1" latinLnBrk="1" hangingPunct="1">
+      <a:lvl4pPr marL="1840070" indent="-262867" algn="l" defTabSz="1051469" rtl="0" eaLnBrk="1" latinLnBrk="1" hangingPunct="1">
         <a:lnSpc>
           <a:spcPct val="90000"/>
         </a:lnSpc>
         <a:spcBef>
-          <a:spcPts val="500"/>
+          <a:spcPts val="575"/>
         </a:spcBef>
         <a:buFont typeface="Arial" panose="020B0604020202020204" pitchFamily="34" charset="0"/>
         <a:buChar char="•"/>
-        <a:defRPr sz="1800" kern="1200">
+        <a:defRPr sz="2070" kern="1200">
           <a:solidFill>
             <a:schemeClr val="tx1"/>
           </a:solidFill>
@@ -2155,16 +2160,16 @@
           <a:cs typeface="+mn-cs"/>
         </a:defRPr>
       </a:lvl4pPr>
-      <a:lvl5pPr marL="2057400" indent="-228600" algn="l" defTabSz="914400" rtl="0" eaLnBrk="1" latinLnBrk="1" hangingPunct="1">
+      <a:lvl5pPr marL="2365804" indent="-262867" algn="l" defTabSz="1051469" rtl="0" eaLnBrk="1" latinLnBrk="1" hangingPunct="1">
         <a:lnSpc>
           <a:spcPct val="90000"/>
         </a:lnSpc>
         <a:spcBef>
-          <a:spcPts val="500"/>
+          <a:spcPts val="575"/>
         </a:spcBef>
         <a:buFont typeface="Arial" panose="020B0604020202020204" pitchFamily="34" charset="0"/>
         <a:buChar char="•"/>
-        <a:defRPr sz="1800" kern="1200">
+        <a:defRPr sz="2070" kern="1200">
           <a:solidFill>
             <a:schemeClr val="tx1"/>
           </a:solidFill>
@@ -2173,16 +2178,16 @@
           <a:cs typeface="+mn-cs"/>
         </a:defRPr>
       </a:lvl5pPr>
-      <a:lvl6pPr marL="2514600" indent="-228600" algn="l" defTabSz="914400" rtl="0" eaLnBrk="1" latinLnBrk="1" hangingPunct="1">
+      <a:lvl6pPr marL="2891539" indent="-262867" algn="l" defTabSz="1051469" rtl="0" eaLnBrk="1" latinLnBrk="1" hangingPunct="1">
         <a:lnSpc>
           <a:spcPct val="90000"/>
         </a:lnSpc>
         <a:spcBef>
-          <a:spcPts val="500"/>
+          <a:spcPts val="575"/>
         </a:spcBef>
         <a:buFont typeface="Arial" panose="020B0604020202020204" pitchFamily="34" charset="0"/>
         <a:buChar char="•"/>
-        <a:defRPr sz="1800" kern="1200">
+        <a:defRPr sz="2070" kern="1200">
           <a:solidFill>
             <a:schemeClr val="tx1"/>
           </a:solidFill>
@@ -2191,16 +2196,16 @@
           <a:cs typeface="+mn-cs"/>
         </a:defRPr>
       </a:lvl6pPr>
-      <a:lvl7pPr marL="2971800" indent="-228600" algn="l" defTabSz="914400" rtl="0" eaLnBrk="1" latinLnBrk="1" hangingPunct="1">
+      <a:lvl7pPr marL="3417273" indent="-262867" algn="l" defTabSz="1051469" rtl="0" eaLnBrk="1" latinLnBrk="1" hangingPunct="1">
         <a:lnSpc>
           <a:spcPct val="90000"/>
         </a:lnSpc>
         <a:spcBef>
-          <a:spcPts val="500"/>
+          <a:spcPts val="575"/>
         </a:spcBef>
         <a:buFont typeface="Arial" panose="020B0604020202020204" pitchFamily="34" charset="0"/>
         <a:buChar char="•"/>
-        <a:defRPr sz="1800" kern="1200">
+        <a:defRPr sz="2070" kern="1200">
           <a:solidFill>
             <a:schemeClr val="tx1"/>
           </a:solidFill>
@@ -2209,16 +2214,16 @@
           <a:cs typeface="+mn-cs"/>
         </a:defRPr>
       </a:lvl7pPr>
-      <a:lvl8pPr marL="3429000" indent="-228600" algn="l" defTabSz="914400" rtl="0" eaLnBrk="1" latinLnBrk="1" hangingPunct="1">
+      <a:lvl8pPr marL="3943007" indent="-262867" algn="l" defTabSz="1051469" rtl="0" eaLnBrk="1" latinLnBrk="1" hangingPunct="1">
         <a:lnSpc>
           <a:spcPct val="90000"/>
         </a:lnSpc>
         <a:spcBef>
-          <a:spcPts val="500"/>
+          <a:spcPts val="575"/>
         </a:spcBef>
         <a:buFont typeface="Arial" panose="020B0604020202020204" pitchFamily="34" charset="0"/>
         <a:buChar char="•"/>
-        <a:defRPr sz="1800" kern="1200">
+        <a:defRPr sz="2070" kern="1200">
           <a:solidFill>
             <a:schemeClr val="tx1"/>
           </a:solidFill>
@@ -2227,16 +2232,16 @@
           <a:cs typeface="+mn-cs"/>
         </a:defRPr>
       </a:lvl8pPr>
-      <a:lvl9pPr marL="3886200" indent="-228600" algn="l" defTabSz="914400" rtl="0" eaLnBrk="1" latinLnBrk="1" hangingPunct="1">
+      <a:lvl9pPr marL="4468741" indent="-262867" algn="l" defTabSz="1051469" rtl="0" eaLnBrk="1" latinLnBrk="1" hangingPunct="1">
         <a:lnSpc>
           <a:spcPct val="90000"/>
         </a:lnSpc>
         <a:spcBef>
-          <a:spcPts val="500"/>
+          <a:spcPts val="575"/>
         </a:spcBef>
         <a:buFont typeface="Arial" panose="020B0604020202020204" pitchFamily="34" charset="0"/>
         <a:buChar char="•"/>
-        <a:defRPr sz="1800" kern="1200">
+        <a:defRPr sz="2070" kern="1200">
           <a:solidFill>
             <a:schemeClr val="tx1"/>
           </a:solidFill>
@@ -2250,8 +2255,8 @@
       <a:defPPr>
         <a:defRPr lang="ko-KR"/>
       </a:defPPr>
-      <a:lvl1pPr marL="0" algn="l" defTabSz="914400" rtl="0" eaLnBrk="1" latinLnBrk="1" hangingPunct="1">
-        <a:defRPr sz="1800" kern="1200">
+      <a:lvl1pPr marL="0" algn="l" defTabSz="1051469" rtl="0" eaLnBrk="1" latinLnBrk="1" hangingPunct="1">
+        <a:defRPr sz="2070" kern="1200">
           <a:solidFill>
             <a:schemeClr val="tx1"/>
           </a:solidFill>
@@ -2260,8 +2265,8 @@
           <a:cs typeface="+mn-cs"/>
         </a:defRPr>
       </a:lvl1pPr>
-      <a:lvl2pPr marL="457200" algn="l" defTabSz="914400" rtl="0" eaLnBrk="1" latinLnBrk="1" hangingPunct="1">
-        <a:defRPr sz="1800" kern="1200">
+      <a:lvl2pPr marL="525734" algn="l" defTabSz="1051469" rtl="0" eaLnBrk="1" latinLnBrk="1" hangingPunct="1">
+        <a:defRPr sz="2070" kern="1200">
           <a:solidFill>
             <a:schemeClr val="tx1"/>
           </a:solidFill>
@@ -2270,8 +2275,8 @@
           <a:cs typeface="+mn-cs"/>
         </a:defRPr>
       </a:lvl2pPr>
-      <a:lvl3pPr marL="914400" algn="l" defTabSz="914400" rtl="0" eaLnBrk="1" latinLnBrk="1" hangingPunct="1">
-        <a:defRPr sz="1800" kern="1200">
+      <a:lvl3pPr marL="1051469" algn="l" defTabSz="1051469" rtl="0" eaLnBrk="1" latinLnBrk="1" hangingPunct="1">
+        <a:defRPr sz="2070" kern="1200">
           <a:solidFill>
             <a:schemeClr val="tx1"/>
           </a:solidFill>
@@ -2280,8 +2285,8 @@
           <a:cs typeface="+mn-cs"/>
         </a:defRPr>
       </a:lvl3pPr>
-      <a:lvl4pPr marL="1371600" algn="l" defTabSz="914400" rtl="0" eaLnBrk="1" latinLnBrk="1" hangingPunct="1">
-        <a:defRPr sz="1800" kern="1200">
+      <a:lvl4pPr marL="1577203" algn="l" defTabSz="1051469" rtl="0" eaLnBrk="1" latinLnBrk="1" hangingPunct="1">
+        <a:defRPr sz="2070" kern="1200">
           <a:solidFill>
             <a:schemeClr val="tx1"/>
           </a:solidFill>
@@ -2290,8 +2295,8 @@
           <a:cs typeface="+mn-cs"/>
         </a:defRPr>
       </a:lvl4pPr>
-      <a:lvl5pPr marL="1828800" algn="l" defTabSz="914400" rtl="0" eaLnBrk="1" latinLnBrk="1" hangingPunct="1">
-        <a:defRPr sz="1800" kern="1200">
+      <a:lvl5pPr marL="2102937" algn="l" defTabSz="1051469" rtl="0" eaLnBrk="1" latinLnBrk="1" hangingPunct="1">
+        <a:defRPr sz="2070" kern="1200">
           <a:solidFill>
             <a:schemeClr val="tx1"/>
           </a:solidFill>
@@ -2300,8 +2305,8 @@
           <a:cs typeface="+mn-cs"/>
         </a:defRPr>
       </a:lvl5pPr>
-      <a:lvl6pPr marL="2286000" algn="l" defTabSz="914400" rtl="0" eaLnBrk="1" latinLnBrk="1" hangingPunct="1">
-        <a:defRPr sz="1800" kern="1200">
+      <a:lvl6pPr marL="2628671" algn="l" defTabSz="1051469" rtl="0" eaLnBrk="1" latinLnBrk="1" hangingPunct="1">
+        <a:defRPr sz="2070" kern="1200">
           <a:solidFill>
             <a:schemeClr val="tx1"/>
           </a:solidFill>
@@ -2310,8 +2315,8 @@
           <a:cs typeface="+mn-cs"/>
         </a:defRPr>
       </a:lvl6pPr>
-      <a:lvl7pPr marL="2743200" algn="l" defTabSz="914400" rtl="0" eaLnBrk="1" latinLnBrk="1" hangingPunct="1">
-        <a:defRPr sz="1800" kern="1200">
+      <a:lvl7pPr marL="3154406" algn="l" defTabSz="1051469" rtl="0" eaLnBrk="1" latinLnBrk="1" hangingPunct="1">
+        <a:defRPr sz="2070" kern="1200">
           <a:solidFill>
             <a:schemeClr val="tx1"/>
           </a:solidFill>
@@ -2320,8 +2325,8 @@
           <a:cs typeface="+mn-cs"/>
         </a:defRPr>
       </a:lvl7pPr>
-      <a:lvl8pPr marL="3200400" algn="l" defTabSz="914400" rtl="0" eaLnBrk="1" latinLnBrk="1" hangingPunct="1">
-        <a:defRPr sz="1800" kern="1200">
+      <a:lvl8pPr marL="3680140" algn="l" defTabSz="1051469" rtl="0" eaLnBrk="1" latinLnBrk="1" hangingPunct="1">
+        <a:defRPr sz="2070" kern="1200">
           <a:solidFill>
             <a:schemeClr val="tx1"/>
           </a:solidFill>
@@ -2330,8 +2335,8 @@
           <a:cs typeface="+mn-cs"/>
         </a:defRPr>
       </a:lvl8pPr>
-      <a:lvl9pPr marL="3657600" algn="l" defTabSz="914400" rtl="0" eaLnBrk="1" latinLnBrk="1" hangingPunct="1">
-        <a:defRPr sz="1800" kern="1200">
+      <a:lvl9pPr marL="4205874" algn="l" defTabSz="1051469" rtl="0" eaLnBrk="1" latinLnBrk="1" hangingPunct="1">
+        <a:defRPr sz="2070" kern="1200">
           <a:solidFill>
             <a:schemeClr val="tx1"/>
           </a:solidFill>
@@ -2362,258 +2367,242 @@
           <a:chExt cx="0" cy="0"/>
         </a:xfrm>
       </p:grpSpPr>
-      <p:pic>
-        <p:nvPicPr>
-          <p:cNvPr id="11" name="그림 10">
+      <p:grpSp>
+        <p:nvGrpSpPr>
+          <p:cNvPr id="3" name="그룹 2">
             <a:extLst>
               <a:ext uri="{FF2B5EF4-FFF2-40B4-BE49-F238E27FC236}">
-                <a16:creationId xmlns:a16="http://schemas.microsoft.com/office/drawing/2014/main" id="{11BBF0DC-5E47-4A97-83DD-4CD3C332B136}"/>
+                <a16:creationId xmlns:a16="http://schemas.microsoft.com/office/drawing/2014/main" id="{217F72D1-4699-4592-AC35-88B0FC35933E}"/>
               </a:ext>
             </a:extLst>
           </p:cNvPr>
-          <p:cNvPicPr>
-            <a:picLocks noChangeAspect="1"/>
-          </p:cNvPicPr>
+          <p:cNvGrpSpPr/>
           <p:nvPr/>
-        </p:nvPicPr>
-        <p:blipFill rotWithShape="1">
-          <a:blip r:embed="rId3">
-            <a:extLst>
-              <a:ext uri="{28A0092B-C50C-407E-A947-70E740481C1C}">
-                <a14:useLocalDpi xmlns:a14="http://schemas.microsoft.com/office/drawing/2010/main" val="0"/>
-              </a:ext>
-            </a:extLst>
-          </a:blip>
-          <a:srcRect l="61958" t="10380" b="4423"/>
-          <a:stretch/>
-        </p:blipFill>
-        <p:spPr>
-          <a:xfrm>
-            <a:off x="41801" y="450"/>
-            <a:ext cx="3223544" cy="3600000"/>
-          </a:xfrm>
-          <a:prstGeom prst="rect">
-            <a:avLst/>
-          </a:prstGeom>
-        </p:spPr>
-      </p:pic>
-      <p:pic>
-        <p:nvPicPr>
-          <p:cNvPr id="7" name="그림 6">
-            <a:extLst>
-              <a:ext uri="{FF2B5EF4-FFF2-40B4-BE49-F238E27FC236}">
-                <a16:creationId xmlns:a16="http://schemas.microsoft.com/office/drawing/2014/main" id="{F6311D4C-A20D-47E8-B012-D87C97EBF0A4}"/>
-              </a:ext>
-            </a:extLst>
-          </p:cNvPr>
-          <p:cNvPicPr>
-            <a:picLocks noChangeAspect="1"/>
-          </p:cNvPicPr>
-          <p:nvPr/>
-        </p:nvPicPr>
-        <p:blipFill rotWithShape="1">
-          <a:blip r:embed="rId4">
-            <a:extLst>
-              <a:ext uri="{28A0092B-C50C-407E-A947-70E740481C1C}">
-                <a14:useLocalDpi xmlns:a14="http://schemas.microsoft.com/office/drawing/2010/main" val="0"/>
-              </a:ext>
-            </a:extLst>
-          </a:blip>
-          <a:srcRect l="1855" t="2302" r="63148" b="52609"/>
-          <a:stretch/>
-        </p:blipFill>
-        <p:spPr>
-          <a:xfrm>
-            <a:off x="3216779" y="450"/>
-            <a:ext cx="3623759" cy="3600000"/>
-          </a:xfrm>
-          <a:prstGeom prst="rect">
-            <a:avLst/>
-          </a:prstGeom>
-        </p:spPr>
-      </p:pic>
-      <p:sp>
-        <p:nvSpPr>
-          <p:cNvPr id="2" name="TextBox 1">
-            <a:extLst>
-              <a:ext uri="{FF2B5EF4-FFF2-40B4-BE49-F238E27FC236}">
-                <a16:creationId xmlns:a16="http://schemas.microsoft.com/office/drawing/2014/main" id="{C4A3F6DC-9DE5-4FE9-BE21-B380A2607ECD}"/>
-              </a:ext>
-            </a:extLst>
-          </p:cNvPr>
-          <p:cNvSpPr txBox="1"/>
-          <p:nvPr/>
-        </p:nvSpPr>
-        <p:spPr>
-          <a:xfrm>
-            <a:off x="946117" y="2882990"/>
-            <a:ext cx="1414913" cy="338554"/>
-          </a:xfrm>
-          <a:prstGeom prst="rect">
-            <a:avLst/>
-          </a:prstGeom>
-          <a:noFill/>
-        </p:spPr>
-        <p:txBody>
-          <a:bodyPr wrap="square" rtlCol="0">
-            <a:spAutoFit/>
-          </a:bodyPr>
-          <a:lstStyle/>
-          <a:p>
-            <a:pPr algn="ctr"/>
-            <a:r>
-              <a:rPr lang="en-US" altLang="ko-KR" sz="1600" b="1" dirty="0">
+        </p:nvGrpSpPr>
+        <p:grpSpPr>
+          <a:xfrm>
+            <a:off x="49902" y="100"/>
+            <a:ext cx="4040396" cy="4140000"/>
+            <a:chOff x="40822" y="57250"/>
+            <a:chExt cx="4040396" cy="4140000"/>
+          </a:xfrm>
+        </p:grpSpPr>
+        <p:pic>
+          <p:nvPicPr>
+            <p:cNvPr id="11" name="그림 10">
+              <a:extLst>
+                <a:ext uri="{FF2B5EF4-FFF2-40B4-BE49-F238E27FC236}">
+                  <a16:creationId xmlns:a16="http://schemas.microsoft.com/office/drawing/2014/main" id="{11BBF0DC-5E47-4A97-83DD-4CD3C332B136}"/>
+                </a:ext>
+              </a:extLst>
+            </p:cNvPr>
+            <p:cNvPicPr>
+              <a:picLocks noChangeAspect="1"/>
+            </p:cNvPicPr>
+            <p:nvPr/>
+          </p:nvPicPr>
+          <p:blipFill rotWithShape="1">
+            <a:blip r:embed="rId3">
+              <a:extLst>
+                <a:ext uri="{28A0092B-C50C-407E-A947-70E740481C1C}">
+                  <a14:useLocalDpi xmlns:a14="http://schemas.microsoft.com/office/drawing/2010/main" val="0"/>
+                </a:ext>
+              </a:extLst>
+            </a:blip>
+            <a:srcRect l="61958" t="7676" b="-2151"/>
+            <a:stretch/>
+          </p:blipFill>
+          <p:spPr>
+            <a:xfrm>
+              <a:off x="40822" y="57250"/>
+              <a:ext cx="1881867" cy="4140000"/>
+            </a:xfrm>
+            <a:prstGeom prst="rect">
+              <a:avLst/>
+            </a:prstGeom>
+          </p:spPr>
+        </p:pic>
+        <p:pic>
+          <p:nvPicPr>
+            <p:cNvPr id="7" name="그림 6">
+              <a:extLst>
+                <a:ext uri="{FF2B5EF4-FFF2-40B4-BE49-F238E27FC236}">
+                  <a16:creationId xmlns:a16="http://schemas.microsoft.com/office/drawing/2014/main" id="{F6311D4C-A20D-47E8-B012-D87C97EBF0A4}"/>
+                </a:ext>
+              </a:extLst>
+            </p:cNvPr>
+            <p:cNvPicPr>
+              <a:picLocks noChangeAspect="1"/>
+            </p:cNvPicPr>
+            <p:nvPr/>
+          </p:nvPicPr>
+          <p:blipFill rotWithShape="1">
+            <a:blip r:embed="rId4">
+              <a:extLst>
+                <a:ext uri="{28A0092B-C50C-407E-A947-70E740481C1C}">
+                  <a14:useLocalDpi xmlns:a14="http://schemas.microsoft.com/office/drawing/2010/main" val="0"/>
+                </a:ext>
+              </a:extLst>
+            </a:blip>
+            <a:srcRect l="2064" t="2302" r="63292" b="52609"/>
+            <a:stretch/>
+          </p:blipFill>
+          <p:spPr>
+            <a:xfrm>
+              <a:off x="1993105" y="1921255"/>
+              <a:ext cx="2088000" cy="2095460"/>
+            </a:xfrm>
+            <a:prstGeom prst="rect">
+              <a:avLst/>
+            </a:prstGeom>
+            <a:effectLst>
+              <a:outerShdw blurRad="63500" sx="102000" sy="102000" algn="ctr" rotWithShape="0">
+                <a:prstClr val="black">
+                  <a:alpha val="40000"/>
+                </a:prstClr>
+              </a:outerShdw>
+            </a:effectLst>
+          </p:spPr>
+        </p:pic>
+        <p:pic>
+          <p:nvPicPr>
+            <p:cNvPr id="13" name="그림 12">
+              <a:extLst>
+                <a:ext uri="{FF2B5EF4-FFF2-40B4-BE49-F238E27FC236}">
+                  <a16:creationId xmlns:a16="http://schemas.microsoft.com/office/drawing/2014/main" id="{271007F6-28AB-4BA2-BDD7-2C1300B90D1E}"/>
+                </a:ext>
+              </a:extLst>
+            </p:cNvPr>
+            <p:cNvPicPr>
+              <a:picLocks noChangeAspect="1"/>
+            </p:cNvPicPr>
+            <p:nvPr/>
+          </p:nvPicPr>
+          <p:blipFill rotWithShape="1">
+            <a:blip r:embed="rId5">
+              <a:extLst>
+                <a:ext uri="{28A0092B-C50C-407E-A947-70E740481C1C}">
+                  <a14:useLocalDpi xmlns:a14="http://schemas.microsoft.com/office/drawing/2010/main" val="0"/>
+                </a:ext>
+              </a:extLst>
+            </a:blip>
+            <a:srcRect l="69485" t="40315" r="1002" b="41429"/>
+            <a:stretch/>
+          </p:blipFill>
+          <p:spPr>
+            <a:xfrm>
+              <a:off x="1993218" y="146708"/>
+              <a:ext cx="2088000" cy="1730727"/>
+            </a:xfrm>
+            <a:prstGeom prst="rect">
+              <a:avLst/>
+            </a:prstGeom>
+            <a:effectLst>
+              <a:outerShdw blurRad="63500" sx="102000" sy="102000" algn="ctr" rotWithShape="0">
+                <a:prstClr val="black">
+                  <a:alpha val="40000"/>
+                </a:prstClr>
+              </a:outerShdw>
+            </a:effectLst>
+          </p:spPr>
+        </p:pic>
+        <p:sp>
+          <p:nvSpPr>
+            <p:cNvPr id="8" name="TextBox 7">
+              <a:extLst>
+                <a:ext uri="{FF2B5EF4-FFF2-40B4-BE49-F238E27FC236}">
+                  <a16:creationId xmlns:a16="http://schemas.microsoft.com/office/drawing/2014/main" id="{14CEE505-51D5-4751-82A2-C8EF19225FD3}"/>
+                </a:ext>
+              </a:extLst>
+            </p:cNvPr>
+            <p:cNvSpPr txBox="1"/>
+            <p:nvPr/>
+          </p:nvSpPr>
+          <p:spPr>
+            <a:xfrm>
+              <a:off x="1993218" y="1501948"/>
+              <a:ext cx="830117" cy="375487"/>
+            </a:xfrm>
+            <a:prstGeom prst="rect">
+              <a:avLst/>
+            </a:prstGeom>
+            <a:noFill/>
+          </p:spPr>
+          <p:txBody>
+            <a:bodyPr wrap="square" rtlCol="0">
+              <a:spAutoFit/>
+            </a:bodyPr>
+            <a:lstStyle/>
+            <a:p>
+              <a:r>
+                <a:rPr lang="en-US" altLang="ko-KR" sz="1840" b="1" dirty="0">
+                  <a:solidFill>
+                    <a:schemeClr val="bg1"/>
+                  </a:solidFill>
+                  <a:latin typeface="Times New Roman" panose="02020603050405020304" pitchFamily="18" charset="0"/>
+                  <a:cs typeface="Times New Roman" panose="02020603050405020304" pitchFamily="18" charset="0"/>
+                </a:rPr>
+                <a:t>SEM</a:t>
+              </a:r>
+              <a:endParaRPr lang="ko-KR" altLang="en-US" sz="1840" b="1" dirty="0">
                 <a:solidFill>
                   <a:schemeClr val="bg1"/>
                 </a:solidFill>
                 <a:latin typeface="Times New Roman" panose="02020603050405020304" pitchFamily="18" charset="0"/>
                 <a:cs typeface="Times New Roman" panose="02020603050405020304" pitchFamily="18" charset="0"/>
-              </a:rPr>
-              <a:t>Photodiode</a:t>
-            </a:r>
-            <a:endParaRPr lang="ko-KR" altLang="en-US" sz="1600" b="1" dirty="0">
-              <a:solidFill>
-                <a:schemeClr val="bg1"/>
-              </a:solidFill>
-              <a:latin typeface="Times New Roman" panose="02020603050405020304" pitchFamily="18" charset="0"/>
-              <a:cs typeface="Times New Roman" panose="02020603050405020304" pitchFamily="18" charset="0"/>
-            </a:endParaRPr>
-          </a:p>
-        </p:txBody>
-      </p:sp>
-      <p:sp>
-        <p:nvSpPr>
-          <p:cNvPr id="9" name="TextBox 8">
-            <a:extLst>
-              <a:ext uri="{FF2B5EF4-FFF2-40B4-BE49-F238E27FC236}">
-                <a16:creationId xmlns:a16="http://schemas.microsoft.com/office/drawing/2014/main" id="{003BB55F-DD94-43C5-8088-6B609E643452}"/>
-              </a:ext>
-            </a:extLst>
-          </p:cNvPr>
-          <p:cNvSpPr txBox="1"/>
-          <p:nvPr/>
-        </p:nvSpPr>
-        <p:spPr>
-          <a:xfrm>
-            <a:off x="5608739" y="1824210"/>
-            <a:ext cx="1337914" cy="338554"/>
-          </a:xfrm>
-          <a:prstGeom prst="rect">
-            <a:avLst/>
-          </a:prstGeom>
-          <a:noFill/>
-        </p:spPr>
-        <p:txBody>
-          <a:bodyPr wrap="square" rtlCol="0">
-            <a:spAutoFit/>
-          </a:bodyPr>
-          <a:lstStyle/>
-          <a:p>
-            <a:pPr algn="ctr"/>
-            <a:r>
-              <a:rPr lang="en-US" altLang="ko-KR" sz="1600" b="1" dirty="0">
+              </a:endParaRPr>
+            </a:p>
+          </p:txBody>
+        </p:sp>
+        <p:sp>
+          <p:nvSpPr>
+            <p:cNvPr id="9" name="TextBox 8">
+              <a:extLst>
+                <a:ext uri="{FF2B5EF4-FFF2-40B4-BE49-F238E27FC236}">
+                  <a16:creationId xmlns:a16="http://schemas.microsoft.com/office/drawing/2014/main" id="{003BB55F-DD94-43C5-8088-6B609E643452}"/>
+                </a:ext>
+              </a:extLst>
+            </p:cNvPr>
+            <p:cNvSpPr txBox="1"/>
+            <p:nvPr/>
+          </p:nvSpPr>
+          <p:spPr>
+            <a:xfrm>
+              <a:off x="1993105" y="3641228"/>
+              <a:ext cx="1538483" cy="375487"/>
+            </a:xfrm>
+            <a:prstGeom prst="rect">
+              <a:avLst/>
+            </a:prstGeom>
+            <a:noFill/>
+          </p:spPr>
+          <p:txBody>
+            <a:bodyPr wrap="square" rtlCol="0">
+              <a:spAutoFit/>
+            </a:bodyPr>
+            <a:lstStyle/>
+            <a:p>
+              <a:r>
+                <a:rPr lang="en-US" altLang="ko-KR" sz="1840" b="1" dirty="0">
+                  <a:solidFill>
+                    <a:schemeClr val="bg1"/>
+                  </a:solidFill>
+                  <a:latin typeface="Times New Roman" panose="02020603050405020304" pitchFamily="18" charset="0"/>
+                  <a:cs typeface="Times New Roman" panose="02020603050405020304" pitchFamily="18" charset="0"/>
+                </a:rPr>
+                <a:t>Focal plane</a:t>
+              </a:r>
+              <a:endParaRPr lang="ko-KR" altLang="en-US" sz="1840" b="1" dirty="0">
                 <a:solidFill>
                   <a:schemeClr val="bg1"/>
                 </a:solidFill>
                 <a:latin typeface="Times New Roman" panose="02020603050405020304" pitchFamily="18" charset="0"/>
                 <a:cs typeface="Times New Roman" panose="02020603050405020304" pitchFamily="18" charset="0"/>
-              </a:rPr>
-              <a:t>Focal plane</a:t>
-            </a:r>
-            <a:endParaRPr lang="ko-KR" altLang="en-US" sz="1600" b="1" dirty="0">
-              <a:solidFill>
-                <a:schemeClr val="bg1"/>
-              </a:solidFill>
-              <a:latin typeface="Times New Roman" panose="02020603050405020304" pitchFamily="18" charset="0"/>
-              <a:cs typeface="Times New Roman" panose="02020603050405020304" pitchFamily="18" charset="0"/>
-            </a:endParaRPr>
-          </a:p>
-        </p:txBody>
-      </p:sp>
-      <p:pic>
-        <p:nvPicPr>
-          <p:cNvPr id="13" name="그림 12">
-            <a:extLst>
-              <a:ext uri="{FF2B5EF4-FFF2-40B4-BE49-F238E27FC236}">
-                <a16:creationId xmlns:a16="http://schemas.microsoft.com/office/drawing/2014/main" id="{271007F6-28AB-4BA2-BDD7-2C1300B90D1E}"/>
-              </a:ext>
-            </a:extLst>
-          </p:cNvPr>
-          <p:cNvPicPr>
-            <a:picLocks noChangeAspect="1"/>
-          </p:cNvPicPr>
-          <p:nvPr/>
-        </p:nvPicPr>
-        <p:blipFill rotWithShape="1">
-          <a:blip r:embed="rId5">
-            <a:extLst>
-              <a:ext uri="{28A0092B-C50C-407E-A947-70E740481C1C}">
-                <a14:useLocalDpi xmlns:a14="http://schemas.microsoft.com/office/drawing/2010/main" val="0"/>
-              </a:ext>
-            </a:extLst>
-          </a:blip>
-          <a:srcRect l="69485" t="40315" r="1002" b="41429"/>
-          <a:stretch/>
-        </p:blipFill>
-        <p:spPr>
-          <a:xfrm>
-            <a:off x="3242973" y="2193131"/>
-            <a:ext cx="1697831" cy="1407319"/>
-          </a:xfrm>
-          <a:prstGeom prst="rect">
-            <a:avLst/>
-          </a:prstGeom>
-        </p:spPr>
-      </p:pic>
-      <p:sp>
-        <p:nvSpPr>
-          <p:cNvPr id="8" name="TextBox 7">
-            <a:extLst>
-              <a:ext uri="{FF2B5EF4-FFF2-40B4-BE49-F238E27FC236}">
-                <a16:creationId xmlns:a16="http://schemas.microsoft.com/office/drawing/2014/main" id="{14CEE505-51D5-4751-82A2-C8EF19225FD3}"/>
-              </a:ext>
-            </a:extLst>
-          </p:cNvPr>
-          <p:cNvSpPr txBox="1"/>
-          <p:nvPr/>
-        </p:nvSpPr>
-        <p:spPr>
-          <a:xfrm>
-            <a:off x="4294757" y="2154344"/>
-            <a:ext cx="721896" cy="338554"/>
-          </a:xfrm>
-          <a:prstGeom prst="rect">
-            <a:avLst/>
-          </a:prstGeom>
-          <a:noFill/>
-        </p:spPr>
-        <p:txBody>
-          <a:bodyPr wrap="square" rtlCol="0">
-            <a:spAutoFit/>
-          </a:bodyPr>
-          <a:lstStyle/>
-          <a:p>
-            <a:pPr algn="ctr"/>
-            <a:r>
-              <a:rPr lang="en-US" altLang="ko-KR" sz="1600" b="1" dirty="0">
-                <a:solidFill>
-                  <a:schemeClr val="bg1"/>
-                </a:solidFill>
-                <a:latin typeface="Times New Roman" panose="02020603050405020304" pitchFamily="18" charset="0"/>
-                <a:cs typeface="Times New Roman" panose="02020603050405020304" pitchFamily="18" charset="0"/>
-              </a:rPr>
-              <a:t>SEM</a:t>
-            </a:r>
-            <a:endParaRPr lang="ko-KR" altLang="en-US" sz="1600" b="1" dirty="0">
-              <a:solidFill>
-                <a:schemeClr val="bg1"/>
-              </a:solidFill>
-              <a:latin typeface="Times New Roman" panose="02020603050405020304" pitchFamily="18" charset="0"/>
-              <a:cs typeface="Times New Roman" panose="02020603050405020304" pitchFamily="18" charset="0"/>
-            </a:endParaRPr>
-          </a:p>
-        </p:txBody>
-      </p:sp>
+              </a:endParaRPr>
+            </a:p>
+          </p:txBody>
+        </p:sp>
+      </p:grpSp>
     </p:spTree>
   </p:cSld>
   <p:clrMapOvr>

</xml_diff>